<commit_message>
Added more text to presentation
</commit_message>
<xml_diff>
--- a/Clustering_Scikit_Learn.pptx
+++ b/Clustering_Scikit_Learn.pptx
@@ -279,7 +279,7 @@
           <a:p>
             <a:fld id="{59667570-53A1-459B-AA66-F38DF90E72D9}" type="datetimeFigureOut">
               <a:rPr lang="de-DE" smtClean="0"/>
-              <a:t>20.11.2022</a:t>
+              <a:t>21.11.2022</a:t>
             </a:fld>
             <a:endParaRPr lang="de-DE" dirty="0"/>
           </a:p>
@@ -501,7 +501,7 @@
           <a:p>
             <a:fld id="{59667570-53A1-459B-AA66-F38DF90E72D9}" type="datetimeFigureOut">
               <a:rPr lang="de-DE" smtClean="0"/>
-              <a:t>20.11.2022</a:t>
+              <a:t>21.11.2022</a:t>
             </a:fld>
             <a:endParaRPr lang="de-DE"/>
           </a:p>
@@ -709,7 +709,7 @@
           <a:p>
             <a:fld id="{59667570-53A1-459B-AA66-F38DF90E72D9}" type="datetimeFigureOut">
               <a:rPr lang="de-DE" smtClean="0"/>
-              <a:t>20.11.2022</a:t>
+              <a:t>21.11.2022</a:t>
             </a:fld>
             <a:endParaRPr lang="de-DE"/>
           </a:p>
@@ -907,7 +907,7 @@
           <a:p>
             <a:fld id="{59667570-53A1-459B-AA66-F38DF90E72D9}" type="datetimeFigureOut">
               <a:rPr lang="de-DE" smtClean="0"/>
-              <a:t>20.11.2022</a:t>
+              <a:t>21.11.2022</a:t>
             </a:fld>
             <a:endParaRPr lang="de-DE"/>
           </a:p>
@@ -1206,7 +1206,7 @@
           <a:p>
             <a:fld id="{59667570-53A1-459B-AA66-F38DF90E72D9}" type="datetimeFigureOut">
               <a:rPr lang="de-DE" smtClean="0"/>
-              <a:t>20.11.2022</a:t>
+              <a:t>21.11.2022</a:t>
             </a:fld>
             <a:endParaRPr lang="de-DE" dirty="0"/>
           </a:p>
@@ -1479,7 +1479,7 @@
           <a:p>
             <a:fld id="{59667570-53A1-459B-AA66-F38DF90E72D9}" type="datetimeFigureOut">
               <a:rPr lang="de-DE" smtClean="0"/>
-              <a:t>20.11.2022</a:t>
+              <a:t>21.11.2022</a:t>
             </a:fld>
             <a:endParaRPr lang="de-DE"/>
           </a:p>
@@ -1891,7 +1891,7 @@
           <a:p>
             <a:fld id="{59667570-53A1-459B-AA66-F38DF90E72D9}" type="datetimeFigureOut">
               <a:rPr lang="de-DE" smtClean="0"/>
-              <a:t>20.11.2022</a:t>
+              <a:t>21.11.2022</a:t>
             </a:fld>
             <a:endParaRPr lang="de-DE"/>
           </a:p>
@@ -2032,7 +2032,7 @@
           <a:p>
             <a:fld id="{59667570-53A1-459B-AA66-F38DF90E72D9}" type="datetimeFigureOut">
               <a:rPr lang="de-DE" smtClean="0"/>
-              <a:t>20.11.2022</a:t>
+              <a:t>21.11.2022</a:t>
             </a:fld>
             <a:endParaRPr lang="de-DE"/>
           </a:p>
@@ -2145,7 +2145,7 @@
           <a:p>
             <a:fld id="{59667570-53A1-459B-AA66-F38DF90E72D9}" type="datetimeFigureOut">
               <a:rPr lang="de-DE" smtClean="0"/>
-              <a:t>20.11.2022</a:t>
+              <a:t>21.11.2022</a:t>
             </a:fld>
             <a:endParaRPr lang="de-DE"/>
           </a:p>
@@ -2456,7 +2456,7 @@
           <a:p>
             <a:fld id="{59667570-53A1-459B-AA66-F38DF90E72D9}" type="datetimeFigureOut">
               <a:rPr lang="de-DE" smtClean="0"/>
-              <a:t>20.11.2022</a:t>
+              <a:t>21.11.2022</a:t>
             </a:fld>
             <a:endParaRPr lang="de-DE"/>
           </a:p>
@@ -2744,7 +2744,7 @@
           <a:p>
             <a:fld id="{59667570-53A1-459B-AA66-F38DF90E72D9}" type="datetimeFigureOut">
               <a:rPr lang="de-DE" smtClean="0"/>
-              <a:t>20.11.2022</a:t>
+              <a:t>21.11.2022</a:t>
             </a:fld>
             <a:endParaRPr lang="de-DE"/>
           </a:p>
@@ -4388,7 +4388,7 @@
               </a:lnSpc>
             </a:pPr>
             <a:r>
-              <a:rPr lang="de-DE" sz="2000" dirty="0" err="1">
+              <a:rPr lang="de-DE" sz="2000" dirty="0">
                 <a:solidFill>
                   <a:schemeClr val="tx1">
                     <a:lumMod val="85000"/>
@@ -4396,7 +4396,72 @@
                   </a:schemeClr>
                 </a:solidFill>
               </a:rPr>
-              <a:t>Lorem</a:t>
+              <a:t>Anzahl Features (d): &gt; 2</a:t>
+            </a:r>
+          </a:p>
+          <a:p>
+            <a:pPr>
+              <a:lnSpc>
+                <a:spcPct val="200000"/>
+              </a:lnSpc>
+            </a:pPr>
+            <a:r>
+              <a:rPr lang="de-DE" sz="2000" dirty="0">
+                <a:solidFill>
+                  <a:schemeClr val="tx1">
+                    <a:lumMod val="85000"/>
+                    <a:lumOff val="15000"/>
+                  </a:schemeClr>
+                </a:solidFill>
+              </a:rPr>
+              <a:t>Hyperparameter-Tuning</a:t>
+            </a:r>
+          </a:p>
+          <a:p>
+            <a:pPr>
+              <a:lnSpc>
+                <a:spcPct val="200000"/>
+              </a:lnSpc>
+            </a:pPr>
+            <a:r>
+              <a:rPr lang="de-DE" sz="2000" dirty="0">
+                <a:solidFill>
+                  <a:schemeClr val="tx1">
+                    <a:lumMod val="85000"/>
+                    <a:lumOff val="15000"/>
+                  </a:schemeClr>
+                </a:solidFill>
+              </a:rPr>
+              <a:t>Bias</a:t>
+            </a:r>
+          </a:p>
+          <a:p>
+            <a:pPr>
+              <a:lnSpc>
+                <a:spcPct val="200000"/>
+              </a:lnSpc>
+            </a:pPr>
+            <a:r>
+              <a:rPr lang="de-DE" sz="2000" dirty="0">
+                <a:solidFill>
+                  <a:schemeClr val="tx1">
+                    <a:lumMod val="85000"/>
+                    <a:lumOff val="15000"/>
+                  </a:schemeClr>
+                </a:solidFill>
+              </a:rPr>
+              <a:t>Over- &amp; </a:t>
+            </a:r>
+            <a:r>
+              <a:rPr lang="de-DE" sz="2000" dirty="0" err="1">
+                <a:solidFill>
+                  <a:schemeClr val="tx1">
+                    <a:lumMod val="85000"/>
+                    <a:lumOff val="15000"/>
+                  </a:schemeClr>
+                </a:solidFill>
+              </a:rPr>
+              <a:t>Underfitting</a:t>
             </a:r>
             <a:endParaRPr lang="de-DE" sz="2000" dirty="0">
               <a:solidFill>
@@ -4406,6 +4471,24 @@
                 </a:schemeClr>
               </a:solidFill>
             </a:endParaRPr>
+          </a:p>
+          <a:p>
+            <a:pPr>
+              <a:lnSpc>
+                <a:spcPct val="200000"/>
+              </a:lnSpc>
+            </a:pPr>
+            <a:r>
+              <a:rPr lang="de-DE" sz="2000" dirty="0">
+                <a:solidFill>
+                  <a:schemeClr val="tx1">
+                    <a:lumMod val="85000"/>
+                    <a:lumOff val="15000"/>
+                  </a:schemeClr>
+                </a:solidFill>
+              </a:rPr>
+              <a:t>Vergleich der unterschiedlichen Cluster-Scores</a:t>
+            </a:r>
           </a:p>
         </p:txBody>
       </p:sp>
@@ -5721,7 +5804,7 @@
               </a:lnSpc>
             </a:pPr>
             <a:r>
-              <a:rPr lang="de-DE" sz="2000" dirty="0" err="1">
+              <a:rPr lang="de-DE" sz="2000" dirty="0">
                 <a:solidFill>
                   <a:schemeClr val="tx1">
                     <a:lumMod val="85000"/>
@@ -5729,16 +5812,109 @@
                   </a:schemeClr>
                 </a:solidFill>
               </a:rPr>
-              <a:t>Lorem</a:t>
-            </a:r>
-            <a:endParaRPr lang="de-DE" sz="2000" dirty="0">
-              <a:solidFill>
-                <a:schemeClr val="tx1">
-                  <a:lumMod val="85000"/>
-                  <a:lumOff val="15000"/>
-                </a:schemeClr>
-              </a:solidFill>
-            </a:endParaRPr>
+              <a:t>Verfahren des </a:t>
+            </a:r>
+            <a:r>
+              <a:rPr lang="de-DE" sz="2000" u="sng" dirty="0">
+                <a:solidFill>
+                  <a:srgbClr val="E30019"/>
+                </a:solidFill>
+              </a:rPr>
+              <a:t>maschinellen Lernens</a:t>
+            </a:r>
+          </a:p>
+          <a:p>
+            <a:pPr>
+              <a:lnSpc>
+                <a:spcPct val="200000"/>
+              </a:lnSpc>
+            </a:pPr>
+            <a:r>
+              <a:rPr lang="de-DE" sz="2000" dirty="0">
+                <a:solidFill>
+                  <a:schemeClr val="tx1">
+                    <a:lumMod val="85000"/>
+                    <a:lumOff val="15000"/>
+                  </a:schemeClr>
+                </a:solidFill>
+              </a:rPr>
+              <a:t>In einer Menge von </a:t>
+            </a:r>
+            <a:r>
+              <a:rPr lang="de-DE" sz="2000" b="1" dirty="0">
+                <a:solidFill>
+                  <a:srgbClr val="E30019"/>
+                </a:solidFill>
+              </a:rPr>
+              <a:t>Daten</a:t>
+            </a:r>
+            <a:r>
+              <a:rPr lang="de-DE" sz="2000" dirty="0">
+                <a:solidFill>
+                  <a:schemeClr val="tx1">
+                    <a:lumMod val="85000"/>
+                    <a:lumOff val="15000"/>
+                  </a:schemeClr>
+                </a:solidFill>
+              </a:rPr>
+              <a:t> „ähnliche “ </a:t>
+            </a:r>
+            <a:r>
+              <a:rPr lang="de-DE" sz="2000" b="1" dirty="0">
+                <a:solidFill>
+                  <a:srgbClr val="E30019"/>
+                </a:solidFill>
+              </a:rPr>
+              <a:t>Gruppierungen (Cluster) </a:t>
+            </a:r>
+            <a:r>
+              <a:rPr lang="de-DE" sz="2000" dirty="0">
+                <a:solidFill>
+                  <a:schemeClr val="tx1">
+                    <a:lumMod val="85000"/>
+                    <a:lumOff val="15000"/>
+                  </a:schemeClr>
+                </a:solidFill>
+              </a:rPr>
+              <a:t>erkennen</a:t>
+            </a:r>
+          </a:p>
+          <a:p>
+            <a:pPr>
+              <a:lnSpc>
+                <a:spcPct val="200000"/>
+              </a:lnSpc>
+            </a:pPr>
+            <a:r>
+              <a:rPr lang="de-DE" sz="2000" dirty="0">
+                <a:solidFill>
+                  <a:schemeClr val="tx1">
+                    <a:lumMod val="85000"/>
+                    <a:lumOff val="15000"/>
+                  </a:schemeClr>
+                </a:solidFill>
+              </a:rPr>
+              <a:t>Einsatz unterschiedlicher </a:t>
+            </a:r>
+            <a:r>
+              <a:rPr lang="de-DE" sz="2000" b="1" dirty="0">
+                <a:solidFill>
+                  <a:srgbClr val="E30019"/>
+                </a:solidFill>
+              </a:rPr>
+              <a:t>Algorithmen</a:t>
+            </a:r>
+            <a:r>
+              <a:rPr lang="de-DE" sz="2000" dirty="0">
+                <a:solidFill>
+                  <a:schemeClr val="tx1">
+                    <a:lumMod val="85000"/>
+                    <a:lumOff val="15000"/>
+                  </a:schemeClr>
+                </a:solidFill>
+              </a:rPr>
+              <a:t> zur Bildung der Cluster</a:t>
+            </a:r>
           </a:p>
         </p:txBody>
       </p:sp>
@@ -6321,7 +6497,15 @@
               </a:lnSpc>
             </a:pPr>
             <a:r>
-              <a:rPr lang="de-DE" sz="2000" dirty="0" err="1">
+              <a:rPr lang="de-DE" sz="2000" b="1" dirty="0">
+                <a:solidFill>
+                  <a:srgbClr val="E30019"/>
+                </a:solidFill>
+              </a:rPr>
+              <a:t>Raumklima</a:t>
+            </a:r>
+            <a:r>
+              <a:rPr lang="de-DE" sz="2000" dirty="0">
                 <a:solidFill>
                   <a:schemeClr val="tx1">
                     <a:lumMod val="85000"/>
@@ -6329,16 +6513,127 @@
                   </a:schemeClr>
                 </a:solidFill>
               </a:rPr>
-              <a:t>Lorem</a:t>
-            </a:r>
-            <a:endParaRPr lang="de-DE" sz="2000" dirty="0">
-              <a:solidFill>
-                <a:schemeClr val="tx1">
-                  <a:lumMod val="85000"/>
-                  <a:lumOff val="15000"/>
-                </a:schemeClr>
-              </a:solidFill>
-            </a:endParaRPr>
+              <a:t>-Datensatz</a:t>
+            </a:r>
+          </a:p>
+          <a:p>
+            <a:pPr>
+              <a:lnSpc>
+                <a:spcPct val="200000"/>
+              </a:lnSpc>
+            </a:pPr>
+            <a:r>
+              <a:rPr lang="de-DE" sz="2000" dirty="0">
+                <a:solidFill>
+                  <a:schemeClr val="tx1">
+                    <a:lumMod val="85000"/>
+                    <a:lumOff val="15000"/>
+                  </a:schemeClr>
+                </a:solidFill>
+              </a:rPr>
+              <a:t>15 Messungen mit </a:t>
+            </a:r>
+            <a:r>
+              <a:rPr lang="de-DE" sz="2000" u="sng" dirty="0">
+                <a:solidFill>
+                  <a:srgbClr val="E30019"/>
+                </a:solidFill>
+              </a:rPr>
+              <a:t>Temperatur</a:t>
+            </a:r>
+            <a:r>
+              <a:rPr lang="de-DE" sz="2000" dirty="0">
+                <a:solidFill>
+                  <a:schemeClr val="tx1">
+                    <a:lumMod val="85000"/>
+                    <a:lumOff val="15000"/>
+                  </a:schemeClr>
+                </a:solidFill>
+              </a:rPr>
+              <a:t> (°C) und </a:t>
+            </a:r>
+            <a:r>
+              <a:rPr lang="de-DE" sz="2000" u="sng" dirty="0">
+                <a:solidFill>
+                  <a:srgbClr val="E30019"/>
+                </a:solidFill>
+              </a:rPr>
+              <a:t>Luftfeuchtigkeit</a:t>
+            </a:r>
+            <a:r>
+              <a:rPr lang="de-DE" sz="2000" dirty="0">
+                <a:solidFill>
+                  <a:schemeClr val="tx1">
+                    <a:lumMod val="85000"/>
+                    <a:lumOff val="15000"/>
+                  </a:schemeClr>
+                </a:solidFill>
+              </a:rPr>
+              <a:t> (%)</a:t>
+            </a:r>
+          </a:p>
+          <a:p>
+            <a:pPr>
+              <a:lnSpc>
+                <a:spcPct val="200000"/>
+              </a:lnSpc>
+            </a:pPr>
+            <a:r>
+              <a:rPr lang="de-DE" sz="2000" dirty="0">
+                <a:solidFill>
+                  <a:schemeClr val="tx1">
+                    <a:lumMod val="85000"/>
+                    <a:lumOff val="15000"/>
+                  </a:schemeClr>
+                </a:solidFill>
+              </a:rPr>
+              <a:t>Unterschiedliche Kombinationen und damit </a:t>
+            </a:r>
+            <a:r>
+              <a:rPr lang="de-DE" sz="2000" u="sng" dirty="0">
+                <a:solidFill>
+                  <a:srgbClr val="E30019"/>
+                </a:solidFill>
+              </a:rPr>
+              <a:t>Klima-Arten</a:t>
+            </a:r>
+          </a:p>
+          <a:p>
+            <a:pPr>
+              <a:lnSpc>
+                <a:spcPct val="200000"/>
+              </a:lnSpc>
+            </a:pPr>
+            <a:r>
+              <a:rPr lang="de-DE" sz="2000" dirty="0">
+                <a:solidFill>
+                  <a:schemeClr val="tx1">
+                    <a:lumMod val="85000"/>
+                    <a:lumOff val="15000"/>
+                  </a:schemeClr>
+                </a:solidFill>
+              </a:rPr>
+              <a:t>Gibt es ein </a:t>
+            </a:r>
+            <a:r>
+              <a:rPr lang="de-DE" sz="2000" b="1" dirty="0">
+                <a:solidFill>
+                  <a:srgbClr val="E30019"/>
+                </a:solidFill>
+              </a:rPr>
+              <a:t>optimales Klima</a:t>
+            </a:r>
+            <a:r>
+              <a:rPr lang="de-DE" sz="2000" dirty="0">
+                <a:solidFill>
+                  <a:schemeClr val="tx1">
+                    <a:lumMod val="85000"/>
+                    <a:lumOff val="15000"/>
+                  </a:schemeClr>
+                </a:solidFill>
+              </a:rPr>
+              <a:t>?</a:t>
+            </a:r>
           </a:p>
         </p:txBody>
       </p:sp>
@@ -6921,7 +7216,7 @@
               </a:lnSpc>
             </a:pPr>
             <a:r>
-              <a:rPr lang="de-DE" sz="2000" dirty="0">
+              <a:rPr lang="de-DE" sz="2000" u="sng" dirty="0">
                 <a:solidFill>
                   <a:schemeClr val="tx1">
                     <a:lumMod val="85000"/>
@@ -6929,15 +7224,8 @@
                   </a:schemeClr>
                 </a:solidFill>
               </a:rPr>
-              <a:t>In der Regel: Metriken anpassen, Umgang Nullwerte, …</a:t>
-            </a:r>
-          </a:p>
-          <a:p>
-            <a:pPr>
-              <a:lnSpc>
-                <a:spcPct val="200000"/>
-              </a:lnSpc>
-            </a:pPr>
+              <a:t>In der Regel:</a:t>
+            </a:r>
             <a:r>
               <a:rPr lang="de-DE" sz="2000" dirty="0">
                 <a:solidFill>
@@ -6947,11 +7235,584 @@
                   </a:schemeClr>
                 </a:solidFill>
               </a:rPr>
-              <a:t>In diesem Fall: Nicht notwendig</a:t>
-            </a:r>
-          </a:p>
-        </p:txBody>
-      </p:sp>
+              <a:t> </a:t>
+            </a:r>
+            <a:r>
+              <a:rPr lang="de-DE" sz="2000" b="1" dirty="0">
+                <a:solidFill>
+                  <a:srgbClr val="FF0000"/>
+                </a:solidFill>
+              </a:rPr>
+              <a:t>Dubletten</a:t>
+            </a:r>
+            <a:r>
+              <a:rPr lang="de-DE" sz="2000" dirty="0">
+                <a:solidFill>
+                  <a:schemeClr val="tx1">
+                    <a:lumMod val="85000"/>
+                    <a:lumOff val="15000"/>
+                  </a:schemeClr>
+                </a:solidFill>
+              </a:rPr>
+              <a:t> entfernen, </a:t>
+            </a:r>
+            <a:r>
+              <a:rPr lang="de-DE" sz="2000" b="1" dirty="0">
+                <a:solidFill>
+                  <a:srgbClr val="FF0000"/>
+                </a:solidFill>
+              </a:rPr>
+              <a:t>Metriken</a:t>
+            </a:r>
+            <a:r>
+              <a:rPr lang="de-DE" sz="2000" dirty="0">
+                <a:solidFill>
+                  <a:schemeClr val="tx1">
+                    <a:lumMod val="85000"/>
+                    <a:lumOff val="15000"/>
+                  </a:schemeClr>
+                </a:solidFill>
+              </a:rPr>
+              <a:t> anpassen, Umgang </a:t>
+            </a:r>
+            <a:r>
+              <a:rPr lang="de-DE" sz="2000" b="1" dirty="0">
+                <a:solidFill>
+                  <a:srgbClr val="FF0000"/>
+                </a:solidFill>
+              </a:rPr>
+              <a:t>Nullwerte</a:t>
+            </a:r>
+            <a:r>
+              <a:rPr lang="de-DE" sz="2000" dirty="0">
+                <a:solidFill>
+                  <a:schemeClr val="tx1">
+                    <a:lumMod val="85000"/>
+                    <a:lumOff val="15000"/>
+                  </a:schemeClr>
+                </a:solidFill>
+              </a:rPr>
+              <a:t>, usw.</a:t>
+            </a:r>
+          </a:p>
+          <a:p>
+            <a:pPr>
+              <a:lnSpc>
+                <a:spcPct val="200000"/>
+              </a:lnSpc>
+            </a:pPr>
+            <a:r>
+              <a:rPr lang="de-DE" sz="2000" u="sng" dirty="0">
+                <a:solidFill>
+                  <a:schemeClr val="tx1">
+                    <a:lumMod val="85000"/>
+                    <a:lumOff val="15000"/>
+                  </a:schemeClr>
+                </a:solidFill>
+              </a:rPr>
+              <a:t>In diesem Fall:</a:t>
+            </a:r>
+            <a:r>
+              <a:rPr lang="de-DE" sz="2000" dirty="0">
+                <a:solidFill>
+                  <a:schemeClr val="tx1">
+                    <a:lumMod val="85000"/>
+                    <a:lumOff val="15000"/>
+                  </a:schemeClr>
+                </a:solidFill>
+              </a:rPr>
+              <a:t> Nicht notwendig</a:t>
+            </a:r>
+          </a:p>
+        </p:txBody>
+      </p:sp>
+      <p:graphicFrame>
+        <p:nvGraphicFramePr>
+          <p:cNvPr id="3" name="Tabelle 3">
+            <a:extLst>
+              <a:ext uri="{FF2B5EF4-FFF2-40B4-BE49-F238E27FC236}">
+                <a16:creationId xmlns:a16="http://schemas.microsoft.com/office/drawing/2014/main" id="{63BA5B38-3645-900D-DAAD-993F03F292BE}"/>
+              </a:ext>
+            </a:extLst>
+          </p:cNvPr>
+          <p:cNvGraphicFramePr>
+            <a:graphicFrameLocks noGrp="1"/>
+          </p:cNvGraphicFramePr>
+          <p:nvPr>
+            <p:extLst>
+              <p:ext uri="{D42A27DB-BD31-4B8C-83A1-F6EECF244321}">
+                <p14:modId xmlns:p14="http://schemas.microsoft.com/office/powerpoint/2010/main" val="3553829922"/>
+              </p:ext>
+            </p:extLst>
+          </p:nvPr>
+        </p:nvGraphicFramePr>
+        <p:xfrm>
+          <a:off x="5114626" y="2519680"/>
+          <a:ext cx="4997572" cy="3073400"/>
+        </p:xfrm>
+        <a:graphic>
+          <a:graphicData uri="http://schemas.openxmlformats.org/drawingml/2006/table">
+            <a:tbl>
+              <a:tblPr firstRow="1" bandRow="1">
+                <a:tableStyleId>{073A0DAA-6AF3-43AB-8588-CEC1D06C72B9}</a:tableStyleId>
+              </a:tblPr>
+              <a:tblGrid>
+                <a:gridCol w="2498786">
+                  <a:extLst>
+                    <a:ext uri="{9D8B030D-6E8A-4147-A177-3AD203B41FA5}">
+                      <a16:colId xmlns:a16="http://schemas.microsoft.com/office/drawing/2014/main" val="2221039887"/>
+                    </a:ext>
+                  </a:extLst>
+                </a:gridCol>
+                <a:gridCol w="2498786">
+                  <a:extLst>
+                    <a:ext uri="{9D8B030D-6E8A-4147-A177-3AD203B41FA5}">
+                      <a16:colId xmlns:a16="http://schemas.microsoft.com/office/drawing/2014/main" val="2599814503"/>
+                    </a:ext>
+                  </a:extLst>
+                </a:gridCol>
+              </a:tblGrid>
+              <a:tr h="217571">
+                <a:tc>
+                  <a:txBody>
+                    <a:bodyPr/>
+                    <a:lstStyle/>
+                    <a:p>
+                      <a:pPr algn="ctr" fontAlgn="ctr"/>
+                      <a:r>
+                        <a:rPr lang="de-DE" sz="1500" dirty="0">
+                          <a:effectLst/>
+                        </a:rPr>
+                        <a:t>Feuchte (in %)</a:t>
+                      </a:r>
+                    </a:p>
+                  </a:txBody>
+                  <a:tcPr marL="50800" marR="50800" marT="25400" marB="25400" anchor="ctr">
+                    <a:solidFill>
+                      <a:srgbClr val="E30019"/>
+                    </a:solidFill>
+                  </a:tcPr>
+                </a:tc>
+                <a:tc>
+                  <a:txBody>
+                    <a:bodyPr/>
+                    <a:lstStyle/>
+                    <a:p>
+                      <a:pPr algn="ctr" fontAlgn="ctr"/>
+                      <a:r>
+                        <a:rPr lang="de-DE" sz="1500" dirty="0">
+                          <a:effectLst/>
+                        </a:rPr>
+                        <a:t>Temperatur (in °C)</a:t>
+                      </a:r>
+                    </a:p>
+                  </a:txBody>
+                  <a:tcPr marL="50800" marR="50800" marT="25400" marB="25400" anchor="ctr">
+                    <a:solidFill>
+                      <a:srgbClr val="E30019"/>
+                    </a:solidFill>
+                  </a:tcPr>
+                </a:tc>
+                <a:extLst>
+                  <a:ext uri="{0D108BD9-81ED-4DB2-BD59-A6C34878D82A}">
+                    <a16:rowId xmlns:a16="http://schemas.microsoft.com/office/drawing/2014/main" val="3345817764"/>
+                  </a:ext>
+                </a:extLst>
+              </a:tr>
+              <a:tr h="217571">
+                <a:tc>
+                  <a:txBody>
+                    <a:bodyPr/>
+                    <a:lstStyle/>
+                    <a:p>
+                      <a:pPr algn="ctr"/>
+                      <a:r>
+                        <a:rPr lang="de-DE" sz="1500">
+                          <a:effectLst/>
+                        </a:rPr>
+                        <a:t>42</a:t>
+                      </a:r>
+                    </a:p>
+                  </a:txBody>
+                  <a:tcPr marL="50800" marR="50800" marT="25400" marB="25400" anchor="ctr"/>
+                </a:tc>
+                <a:tc>
+                  <a:txBody>
+                    <a:bodyPr/>
+                    <a:lstStyle/>
+                    <a:p>
+                      <a:pPr algn="ctr"/>
+                      <a:r>
+                        <a:rPr lang="de-DE" sz="1500">
+                          <a:effectLst/>
+                        </a:rPr>
+                        <a:t>21</a:t>
+                      </a:r>
+                    </a:p>
+                  </a:txBody>
+                  <a:tcPr marL="50800" marR="50800" marT="25400" marB="25400" anchor="ctr"/>
+                </a:tc>
+                <a:extLst>
+                  <a:ext uri="{0D108BD9-81ED-4DB2-BD59-A6C34878D82A}">
+                    <a16:rowId xmlns:a16="http://schemas.microsoft.com/office/drawing/2014/main" val="4042259133"/>
+                  </a:ext>
+                </a:extLst>
+              </a:tr>
+              <a:tr h="217571">
+                <a:tc>
+                  <a:txBody>
+                    <a:bodyPr/>
+                    <a:lstStyle/>
+                    <a:p>
+                      <a:pPr algn="ctr"/>
+                      <a:r>
+                        <a:rPr lang="de-DE" sz="1500">
+                          <a:effectLst/>
+                        </a:rPr>
+                        <a:t>45</a:t>
+                      </a:r>
+                    </a:p>
+                  </a:txBody>
+                  <a:tcPr marL="50800" marR="50800" marT="25400" marB="25400" anchor="ctr"/>
+                </a:tc>
+                <a:tc>
+                  <a:txBody>
+                    <a:bodyPr/>
+                    <a:lstStyle/>
+                    <a:p>
+                      <a:pPr algn="ctr"/>
+                      <a:r>
+                        <a:rPr lang="de-DE" sz="1500">
+                          <a:effectLst/>
+                        </a:rPr>
+                        <a:t>19</a:t>
+                      </a:r>
+                    </a:p>
+                  </a:txBody>
+                  <a:tcPr marL="50800" marR="50800" marT="25400" marB="25400" anchor="ctr"/>
+                </a:tc>
+                <a:extLst>
+                  <a:ext uri="{0D108BD9-81ED-4DB2-BD59-A6C34878D82A}">
+                    <a16:rowId xmlns:a16="http://schemas.microsoft.com/office/drawing/2014/main" val="3329224589"/>
+                  </a:ext>
+                </a:extLst>
+              </a:tr>
+              <a:tr h="217571">
+                <a:tc>
+                  <a:txBody>
+                    <a:bodyPr/>
+                    <a:lstStyle/>
+                    <a:p>
+                      <a:pPr algn="ctr"/>
+                      <a:r>
+                        <a:rPr lang="de-DE" sz="1500">
+                          <a:effectLst/>
+                        </a:rPr>
+                        <a:t>52</a:t>
+                      </a:r>
+                    </a:p>
+                  </a:txBody>
+                  <a:tcPr marL="50800" marR="50800" marT="25400" marB="25400" anchor="ctr"/>
+                </a:tc>
+                <a:tc>
+                  <a:txBody>
+                    <a:bodyPr/>
+                    <a:lstStyle/>
+                    <a:p>
+                      <a:pPr algn="ctr"/>
+                      <a:r>
+                        <a:rPr lang="de-DE" sz="1500">
+                          <a:effectLst/>
+                        </a:rPr>
+                        <a:t>19</a:t>
+                      </a:r>
+                    </a:p>
+                  </a:txBody>
+                  <a:tcPr marL="50800" marR="50800" marT="25400" marB="25400" anchor="ctr"/>
+                </a:tc>
+                <a:extLst>
+                  <a:ext uri="{0D108BD9-81ED-4DB2-BD59-A6C34878D82A}">
+                    <a16:rowId xmlns:a16="http://schemas.microsoft.com/office/drawing/2014/main" val="828816034"/>
+                  </a:ext>
+                </a:extLst>
+              </a:tr>
+              <a:tr h="217571">
+                <a:tc>
+                  <a:txBody>
+                    <a:bodyPr/>
+                    <a:lstStyle/>
+                    <a:p>
+                      <a:pPr algn="ctr"/>
+                      <a:r>
+                        <a:rPr lang="de-DE" sz="1500">
+                          <a:effectLst/>
+                        </a:rPr>
+                        <a:t>55</a:t>
+                      </a:r>
+                    </a:p>
+                  </a:txBody>
+                  <a:tcPr marL="50800" marR="50800" marT="25400" marB="25400" anchor="ctr"/>
+                </a:tc>
+                <a:tc>
+                  <a:txBody>
+                    <a:bodyPr/>
+                    <a:lstStyle/>
+                    <a:p>
+                      <a:pPr algn="ctr"/>
+                      <a:r>
+                        <a:rPr lang="de-DE" sz="1500">
+                          <a:effectLst/>
+                        </a:rPr>
+                        <a:t>21</a:t>
+                      </a:r>
+                    </a:p>
+                  </a:txBody>
+                  <a:tcPr marL="50800" marR="50800" marT="25400" marB="25400" anchor="ctr"/>
+                </a:tc>
+                <a:extLst>
+                  <a:ext uri="{0D108BD9-81ED-4DB2-BD59-A6C34878D82A}">
+                    <a16:rowId xmlns:a16="http://schemas.microsoft.com/office/drawing/2014/main" val="2087478695"/>
+                  </a:ext>
+                </a:extLst>
+              </a:tr>
+              <a:tr h="217571">
+                <a:tc>
+                  <a:txBody>
+                    <a:bodyPr/>
+                    <a:lstStyle/>
+                    <a:p>
+                      <a:pPr algn="ctr"/>
+                      <a:r>
+                        <a:rPr lang="de-DE" sz="1500">
+                          <a:effectLst/>
+                        </a:rPr>
+                        <a:t>53</a:t>
+                      </a:r>
+                    </a:p>
+                  </a:txBody>
+                  <a:tcPr marL="50800" marR="50800" marT="25400" marB="25400" anchor="ctr"/>
+                </a:tc>
+                <a:tc>
+                  <a:txBody>
+                    <a:bodyPr/>
+                    <a:lstStyle/>
+                    <a:p>
+                      <a:pPr algn="ctr"/>
+                      <a:r>
+                        <a:rPr lang="de-DE" sz="1500">
+                          <a:effectLst/>
+                        </a:rPr>
+                        <a:t>22</a:t>
+                      </a:r>
+                    </a:p>
+                  </a:txBody>
+                  <a:tcPr marL="50800" marR="50800" marT="25400" marB="25400" anchor="ctr"/>
+                </a:tc>
+                <a:extLst>
+                  <a:ext uri="{0D108BD9-81ED-4DB2-BD59-A6C34878D82A}">
+                    <a16:rowId xmlns:a16="http://schemas.microsoft.com/office/drawing/2014/main" val="2885489644"/>
+                  </a:ext>
+                </a:extLst>
+              </a:tr>
+              <a:tr h="217571">
+                <a:tc>
+                  <a:txBody>
+                    <a:bodyPr/>
+                    <a:lstStyle/>
+                    <a:p>
+                      <a:pPr algn="ctr"/>
+                      <a:r>
+                        <a:rPr lang="de-DE" sz="1500">
+                          <a:effectLst/>
+                        </a:rPr>
+                        <a:t>69</a:t>
+                      </a:r>
+                    </a:p>
+                  </a:txBody>
+                  <a:tcPr marL="50800" marR="50800" marT="25400" marB="25400" anchor="ctr"/>
+                </a:tc>
+                <a:tc>
+                  <a:txBody>
+                    <a:bodyPr/>
+                    <a:lstStyle/>
+                    <a:p>
+                      <a:pPr algn="ctr"/>
+                      <a:r>
+                        <a:rPr lang="de-DE" sz="1500">
+                          <a:effectLst/>
+                        </a:rPr>
+                        <a:t>23</a:t>
+                      </a:r>
+                    </a:p>
+                  </a:txBody>
+                  <a:tcPr marL="50800" marR="50800" marT="25400" marB="25400" anchor="ctr"/>
+                </a:tc>
+                <a:extLst>
+                  <a:ext uri="{0D108BD9-81ED-4DB2-BD59-A6C34878D82A}">
+                    <a16:rowId xmlns:a16="http://schemas.microsoft.com/office/drawing/2014/main" val="180312750"/>
+                  </a:ext>
+                </a:extLst>
+              </a:tr>
+              <a:tr h="217571">
+                <a:tc>
+                  <a:txBody>
+                    <a:bodyPr/>
+                    <a:lstStyle/>
+                    <a:p>
+                      <a:pPr algn="ctr"/>
+                      <a:r>
+                        <a:rPr lang="de-DE" sz="1500">
+                          <a:effectLst/>
+                        </a:rPr>
+                        <a:t>80</a:t>
+                      </a:r>
+                    </a:p>
+                  </a:txBody>
+                  <a:tcPr marL="50800" marR="50800" marT="25400" marB="25400" anchor="ctr"/>
+                </a:tc>
+                <a:tc>
+                  <a:txBody>
+                    <a:bodyPr/>
+                    <a:lstStyle/>
+                    <a:p>
+                      <a:pPr algn="ctr"/>
+                      <a:r>
+                        <a:rPr lang="de-DE" sz="1500">
+                          <a:effectLst/>
+                        </a:rPr>
+                        <a:t>21</a:t>
+                      </a:r>
+                    </a:p>
+                  </a:txBody>
+                  <a:tcPr marL="50800" marR="50800" marT="25400" marB="25400" anchor="ctr"/>
+                </a:tc>
+                <a:extLst>
+                  <a:ext uri="{0D108BD9-81ED-4DB2-BD59-A6C34878D82A}">
+                    <a16:rowId xmlns:a16="http://schemas.microsoft.com/office/drawing/2014/main" val="2040250038"/>
+                  </a:ext>
+                </a:extLst>
+              </a:tr>
+              <a:tr h="217571">
+                <a:tc>
+                  <a:txBody>
+                    <a:bodyPr/>
+                    <a:lstStyle/>
+                    <a:p>
+                      <a:pPr algn="ctr"/>
+                      <a:r>
+                        <a:rPr lang="de-DE" sz="1500">
+                          <a:effectLst/>
+                        </a:rPr>
+                        <a:t>81</a:t>
+                      </a:r>
+                    </a:p>
+                  </a:txBody>
+                  <a:tcPr marL="50800" marR="50800" marT="25400" marB="25400" anchor="ctr"/>
+                </a:tc>
+                <a:tc>
+                  <a:txBody>
+                    <a:bodyPr/>
+                    <a:lstStyle/>
+                    <a:p>
+                      <a:pPr algn="ctr"/>
+                      <a:r>
+                        <a:rPr lang="de-DE" sz="1500">
+                          <a:effectLst/>
+                        </a:rPr>
+                        <a:t>23</a:t>
+                      </a:r>
+                    </a:p>
+                  </a:txBody>
+                  <a:tcPr marL="50800" marR="50800" marT="25400" marB="25400" anchor="ctr"/>
+                </a:tc>
+                <a:extLst>
+                  <a:ext uri="{0D108BD9-81ED-4DB2-BD59-A6C34878D82A}">
+                    <a16:rowId xmlns:a16="http://schemas.microsoft.com/office/drawing/2014/main" val="1792044841"/>
+                  </a:ext>
+                </a:extLst>
+              </a:tr>
+              <a:tr h="217571">
+                <a:tc>
+                  <a:txBody>
+                    <a:bodyPr/>
+                    <a:lstStyle/>
+                    <a:p>
+                      <a:pPr algn="ctr"/>
+                      <a:r>
+                        <a:rPr lang="de-DE" sz="1500">
+                          <a:effectLst/>
+                        </a:rPr>
+                        <a:t>73</a:t>
+                      </a:r>
+                    </a:p>
+                  </a:txBody>
+                  <a:tcPr marL="50800" marR="50800" marT="25400" marB="25400" anchor="ctr"/>
+                </a:tc>
+                <a:tc>
+                  <a:txBody>
+                    <a:bodyPr/>
+                    <a:lstStyle/>
+                    <a:p>
+                      <a:pPr algn="ctr"/>
+                      <a:r>
+                        <a:rPr lang="de-DE" sz="1500">
+                          <a:effectLst/>
+                        </a:rPr>
+                        <a:t>25</a:t>
+                      </a:r>
+                    </a:p>
+                  </a:txBody>
+                  <a:tcPr marL="50800" marR="50800" marT="25400" marB="25400" anchor="ctr"/>
+                </a:tc>
+                <a:extLst>
+                  <a:ext uri="{0D108BD9-81ED-4DB2-BD59-A6C34878D82A}">
+                    <a16:rowId xmlns:a16="http://schemas.microsoft.com/office/drawing/2014/main" val="1112722223"/>
+                  </a:ext>
+                </a:extLst>
+              </a:tr>
+              <a:tr h="217571">
+                <a:tc>
+                  <a:txBody>
+                    <a:bodyPr/>
+                    <a:lstStyle/>
+                    <a:p>
+                      <a:pPr algn="ctr"/>
+                      <a:r>
+                        <a:rPr lang="de-DE" sz="1500" dirty="0">
+                          <a:effectLst/>
+                        </a:rPr>
+                        <a:t>75</a:t>
+                      </a:r>
+                    </a:p>
+                  </a:txBody>
+                  <a:tcPr marL="50800" marR="50800" marT="25400" marB="25400" anchor="ctr"/>
+                </a:tc>
+                <a:tc>
+                  <a:txBody>
+                    <a:bodyPr/>
+                    <a:lstStyle/>
+                    <a:p>
+                      <a:pPr algn="ctr"/>
+                      <a:r>
+                        <a:rPr lang="de-DE" sz="1500" dirty="0">
+                          <a:effectLst/>
+                        </a:rPr>
+                        <a:t>25</a:t>
+                      </a:r>
+                    </a:p>
+                  </a:txBody>
+                  <a:tcPr marL="50800" marR="50800" marT="25400" marB="25400" anchor="ctr"/>
+                </a:tc>
+                <a:extLst>
+                  <a:ext uri="{0D108BD9-81ED-4DB2-BD59-A6C34878D82A}">
+                    <a16:rowId xmlns:a16="http://schemas.microsoft.com/office/drawing/2014/main" val="2107948847"/>
+                  </a:ext>
+                </a:extLst>
+              </a:tr>
+            </a:tbl>
+          </a:graphicData>
+        </a:graphic>
+      </p:graphicFrame>
     </p:spTree>
     <p:extLst>
       <p:ext uri="{BB962C8B-B14F-4D97-AF65-F5344CB8AC3E}">
@@ -7541,12 +8402,73 @@
           </a:p>
         </p:txBody>
       </p:sp>
+      <p:sp>
+        <p:nvSpPr>
+          <p:cNvPr id="2" name="Textfeld 1">
+            <a:extLst>
+              <a:ext uri="{FF2B5EF4-FFF2-40B4-BE49-F238E27FC236}">
+                <a16:creationId xmlns:a16="http://schemas.microsoft.com/office/drawing/2014/main" id="{DC402030-A262-A55C-2834-D01BBCE7AE12}"/>
+              </a:ext>
+            </a:extLst>
+          </p:cNvPr>
+          <p:cNvSpPr txBox="1"/>
+          <p:nvPr/>
+        </p:nvSpPr>
+        <p:spPr>
+          <a:xfrm>
+            <a:off x="10327639" y="5346859"/>
+            <a:ext cx="1524649" cy="246221"/>
+          </a:xfrm>
+          <a:prstGeom prst="rect">
+            <a:avLst/>
+          </a:prstGeom>
+          <a:noFill/>
+        </p:spPr>
+        <p:txBody>
+          <a:bodyPr wrap="square" rtlCol="0">
+            <a:spAutoFit/>
+          </a:bodyPr>
+          <a:lstStyle/>
+          <a:p>
+            <a:r>
+              <a:rPr lang="de-DE" sz="1000" i="1" dirty="0">
+                <a:solidFill>
+                  <a:schemeClr val="tx1">
+                    <a:lumMod val="85000"/>
+                    <a:lumOff val="15000"/>
+                  </a:schemeClr>
+                </a:solidFill>
+              </a:rPr>
+              <a:t>Visualisiert mit </a:t>
+            </a:r>
+            <a:r>
+              <a:rPr lang="de-DE" sz="1000" i="1" dirty="0" err="1">
+                <a:solidFill>
+                  <a:schemeClr val="tx1">
+                    <a:lumMod val="85000"/>
+                    <a:lumOff val="15000"/>
+                  </a:schemeClr>
+                </a:solidFill>
+              </a:rPr>
+              <a:t>Matplotlib</a:t>
+            </a:r>
+            <a:endParaRPr lang="de-DE" sz="1000" i="1" dirty="0">
+              <a:solidFill>
+                <a:schemeClr val="tx1">
+                  <a:lumMod val="85000"/>
+                  <a:lumOff val="15000"/>
+                </a:schemeClr>
+              </a:solidFill>
+            </a:endParaRPr>
+          </a:p>
+        </p:txBody>
+      </p:sp>
       <p:pic>
         <p:nvPicPr>
-          <p:cNvPr id="3" name="Grafik 2">
-            <a:extLst>
-              <a:ext uri="{FF2B5EF4-FFF2-40B4-BE49-F238E27FC236}">
-                <a16:creationId xmlns:a16="http://schemas.microsoft.com/office/drawing/2014/main" id="{1D4EDFB0-782E-7362-92F3-6326934681B4}"/>
+          <p:cNvPr id="5" name="Grafik 4">
+            <a:extLst>
+              <a:ext uri="{FF2B5EF4-FFF2-40B4-BE49-F238E27FC236}">
+                <a16:creationId xmlns:a16="http://schemas.microsoft.com/office/drawing/2014/main" id="{E88B7AEA-C67B-1F03-BB09-AF7D4812DBEA}"/>
               </a:ext>
             </a:extLst>
           </p:cNvPr>
@@ -7563,75 +8485,14 @@
         </p:blipFill>
         <p:spPr>
           <a:xfrm>
-            <a:off x="3644538" y="1634361"/>
-            <a:ext cx="4902922" cy="3958719"/>
+            <a:off x="3640208" y="1634361"/>
+            <a:ext cx="4911583" cy="3958718"/>
           </a:xfrm>
           <a:prstGeom prst="rect">
             <a:avLst/>
           </a:prstGeom>
         </p:spPr>
       </p:pic>
-      <p:sp>
-        <p:nvSpPr>
-          <p:cNvPr id="2" name="Textfeld 1">
-            <a:extLst>
-              <a:ext uri="{FF2B5EF4-FFF2-40B4-BE49-F238E27FC236}">
-                <a16:creationId xmlns:a16="http://schemas.microsoft.com/office/drawing/2014/main" id="{DC402030-A262-A55C-2834-D01BBCE7AE12}"/>
-              </a:ext>
-            </a:extLst>
-          </p:cNvPr>
-          <p:cNvSpPr txBox="1"/>
-          <p:nvPr/>
-        </p:nvSpPr>
-        <p:spPr>
-          <a:xfrm>
-            <a:off x="10327639" y="5346859"/>
-            <a:ext cx="1524649" cy="246221"/>
-          </a:xfrm>
-          <a:prstGeom prst="rect">
-            <a:avLst/>
-          </a:prstGeom>
-          <a:noFill/>
-        </p:spPr>
-        <p:txBody>
-          <a:bodyPr wrap="square" rtlCol="0">
-            <a:spAutoFit/>
-          </a:bodyPr>
-          <a:lstStyle/>
-          <a:p>
-            <a:r>
-              <a:rPr lang="de-DE" sz="1000" i="1" dirty="0">
-                <a:solidFill>
-                  <a:schemeClr val="tx1">
-                    <a:lumMod val="85000"/>
-                    <a:lumOff val="15000"/>
-                  </a:schemeClr>
-                </a:solidFill>
-              </a:rPr>
-              <a:t>Visualisiert mit </a:t>
-            </a:r>
-            <a:r>
-              <a:rPr lang="de-DE" sz="1000" i="1" dirty="0" err="1">
-                <a:solidFill>
-                  <a:schemeClr val="tx1">
-                    <a:lumMod val="85000"/>
-                    <a:lumOff val="15000"/>
-                  </a:schemeClr>
-                </a:solidFill>
-              </a:rPr>
-              <a:t>Matplotlib</a:t>
-            </a:r>
-            <a:endParaRPr lang="de-DE" sz="1000" i="1" dirty="0">
-              <a:solidFill>
-                <a:schemeClr val="tx1">
-                  <a:lumMod val="85000"/>
-                  <a:lumOff val="15000"/>
-                </a:schemeClr>
-              </a:solidFill>
-            </a:endParaRPr>
-          </a:p>
-        </p:txBody>
-      </p:sp>
     </p:spTree>
     <p:extLst>
       <p:ext uri="{BB962C8B-B14F-4D97-AF65-F5344CB8AC3E}">
@@ -8824,7 +9685,15 @@
               </a:lnSpc>
             </a:pPr>
             <a:r>
-              <a:rPr lang="de-DE" sz="2000" dirty="0" err="1">
+              <a:rPr lang="de-DE" sz="2000" b="1" dirty="0" err="1">
+                <a:solidFill>
+                  <a:srgbClr val="E30019"/>
+                </a:solidFill>
+              </a:rPr>
+              <a:t>Agglomerative</a:t>
+            </a:r>
+            <a:r>
+              <a:rPr lang="de-DE" sz="2000" dirty="0">
                 <a:solidFill>
                   <a:schemeClr val="tx1">
                     <a:lumMod val="85000"/>
@@ -8832,16 +9701,135 @@
                   </a:schemeClr>
                 </a:solidFill>
               </a:rPr>
-              <a:t>Lorem</a:t>
-            </a:r>
-            <a:endParaRPr lang="de-DE" sz="2000" dirty="0">
+              <a:t> Cluster-Analyse</a:t>
+            </a:r>
+          </a:p>
+          <a:p>
+            <a:pPr>
+              <a:lnSpc>
+                <a:spcPct val="200000"/>
+              </a:lnSpc>
+            </a:pPr>
+            <a:r>
+              <a:rPr lang="de-DE" sz="2000" dirty="0">
+                <a:solidFill>
+                  <a:schemeClr val="tx1">
+                    <a:lumMod val="85000"/>
+                    <a:lumOff val="15000"/>
+                  </a:schemeClr>
+                </a:solidFill>
+              </a:rPr>
+              <a:t>Darstellung in </a:t>
+            </a:r>
+            <a:r>
+              <a:rPr lang="de-DE" sz="2000" b="1" dirty="0" err="1">
+                <a:solidFill>
+                  <a:srgbClr val="E30019"/>
+                </a:solidFill>
+              </a:rPr>
+              <a:t>Dendogramm</a:t>
+            </a:r>
+            <a:endParaRPr lang="de-DE" sz="2000" b="1" dirty="0">
               <a:solidFill>
-                <a:schemeClr val="tx1">
-                  <a:lumMod val="85000"/>
-                  <a:lumOff val="15000"/>
-                </a:schemeClr>
+                <a:srgbClr val="E30019"/>
               </a:solidFill>
             </a:endParaRPr>
+          </a:p>
+          <a:p>
+            <a:pPr>
+              <a:lnSpc>
+                <a:spcPct val="200000"/>
+              </a:lnSpc>
+            </a:pPr>
+            <a:r>
+              <a:rPr lang="de-DE" sz="2000" u="sng" dirty="0">
+                <a:solidFill>
+                  <a:schemeClr val="tx1">
+                    <a:lumMod val="85000"/>
+                    <a:lumOff val="15000"/>
+                  </a:schemeClr>
+                </a:solidFill>
+              </a:rPr>
+              <a:t>Abstandfunktion:</a:t>
+            </a:r>
+            <a:r>
+              <a:rPr lang="de-DE" sz="2000" dirty="0">
+                <a:solidFill>
+                  <a:schemeClr val="tx1">
+                    <a:lumMod val="85000"/>
+                    <a:lumOff val="15000"/>
+                  </a:schemeClr>
+                </a:solidFill>
+              </a:rPr>
+              <a:t> </a:t>
+            </a:r>
+            <a:r>
+              <a:rPr lang="de-DE" sz="2000" b="1" dirty="0">
+                <a:solidFill>
+                  <a:srgbClr val="E30019"/>
+                </a:solidFill>
+              </a:rPr>
+              <a:t>Euklidische</a:t>
+            </a:r>
+            <a:r>
+              <a:rPr lang="de-DE" sz="2000" dirty="0">
+                <a:solidFill>
+                  <a:schemeClr val="tx1">
+                    <a:lumMod val="85000"/>
+                    <a:lumOff val="15000"/>
+                  </a:schemeClr>
+                </a:solidFill>
+              </a:rPr>
+              <a:t> Distanz</a:t>
+            </a:r>
+          </a:p>
+          <a:p>
+            <a:pPr>
+              <a:lnSpc>
+                <a:spcPct val="200000"/>
+              </a:lnSpc>
+            </a:pPr>
+            <a:r>
+              <a:rPr lang="de-DE" sz="2000" u="sng" dirty="0">
+                <a:solidFill>
+                  <a:schemeClr val="tx1">
+                    <a:lumMod val="85000"/>
+                    <a:lumOff val="15000"/>
+                  </a:schemeClr>
+                </a:solidFill>
+              </a:rPr>
+              <a:t>Fusionsvorschrift:</a:t>
+            </a:r>
+            <a:r>
+              <a:rPr lang="de-DE" sz="2000" dirty="0">
+                <a:solidFill>
+                  <a:schemeClr val="tx1">
+                    <a:lumMod val="85000"/>
+                    <a:lumOff val="15000"/>
+                  </a:schemeClr>
+                </a:solidFill>
+              </a:rPr>
+              <a:t> </a:t>
+            </a:r>
+            <a:r>
+              <a:rPr lang="de-DE" sz="2000" b="1" dirty="0">
+                <a:solidFill>
+                  <a:srgbClr val="E30019"/>
+                </a:solidFill>
+              </a:rPr>
+              <a:t>Ward</a:t>
+            </a:r>
+            <a:r>
+              <a:rPr lang="de-DE" sz="2000" dirty="0">
+                <a:solidFill>
+                  <a:schemeClr val="tx1">
+                    <a:lumMod val="85000"/>
+                    <a:lumOff val="15000"/>
+                  </a:schemeClr>
+                </a:solidFill>
+              </a:rPr>
+              <a:t> Methode</a:t>
+            </a:r>
           </a:p>
         </p:txBody>
       </p:sp>
@@ -9464,12 +10452,73 @@
           </a:prstGeom>
         </p:spPr>
       </p:pic>
+      <p:sp>
+        <p:nvSpPr>
+          <p:cNvPr id="6" name="Textfeld 5">
+            <a:extLst>
+              <a:ext uri="{FF2B5EF4-FFF2-40B4-BE49-F238E27FC236}">
+                <a16:creationId xmlns:a16="http://schemas.microsoft.com/office/drawing/2014/main" id="{F82BA0CB-6FC6-AE48-C63B-A5C2BA6C0ADC}"/>
+              </a:ext>
+            </a:extLst>
+          </p:cNvPr>
+          <p:cNvSpPr txBox="1"/>
+          <p:nvPr/>
+        </p:nvSpPr>
+        <p:spPr>
+          <a:xfrm>
+            <a:off x="10327639" y="1268809"/>
+            <a:ext cx="1524649" cy="246221"/>
+          </a:xfrm>
+          <a:prstGeom prst="rect">
+            <a:avLst/>
+          </a:prstGeom>
+          <a:noFill/>
+        </p:spPr>
+        <p:txBody>
+          <a:bodyPr wrap="square" rtlCol="0">
+            <a:spAutoFit/>
+          </a:bodyPr>
+          <a:lstStyle/>
+          <a:p>
+            <a:r>
+              <a:rPr lang="de-DE" sz="1000" i="1" dirty="0">
+                <a:solidFill>
+                  <a:schemeClr val="tx1">
+                    <a:lumMod val="85000"/>
+                    <a:lumOff val="15000"/>
+                  </a:schemeClr>
+                </a:solidFill>
+              </a:rPr>
+              <a:t>Visualisiert mit </a:t>
+            </a:r>
+            <a:r>
+              <a:rPr lang="de-DE" sz="1000" i="1" dirty="0" err="1">
+                <a:solidFill>
+                  <a:schemeClr val="tx1">
+                    <a:lumMod val="85000"/>
+                    <a:lumOff val="15000"/>
+                  </a:schemeClr>
+                </a:solidFill>
+              </a:rPr>
+              <a:t>Matplotlib</a:t>
+            </a:r>
+            <a:endParaRPr lang="de-DE" sz="1000" i="1" dirty="0">
+              <a:solidFill>
+                <a:schemeClr val="tx1">
+                  <a:lumMod val="85000"/>
+                  <a:lumOff val="15000"/>
+                </a:schemeClr>
+              </a:solidFill>
+            </a:endParaRPr>
+          </a:p>
+        </p:txBody>
+      </p:sp>
       <p:pic>
         <p:nvPicPr>
-          <p:cNvPr id="5" name="Grafik 4">
-            <a:extLst>
-              <a:ext uri="{FF2B5EF4-FFF2-40B4-BE49-F238E27FC236}">
-                <a16:creationId xmlns:a16="http://schemas.microsoft.com/office/drawing/2014/main" id="{260E0931-D657-B1E6-55AC-99FAF0C30C66}"/>
+          <p:cNvPr id="4" name="Grafik 3">
+            <a:extLst>
+              <a:ext uri="{FF2B5EF4-FFF2-40B4-BE49-F238E27FC236}">
+                <a16:creationId xmlns:a16="http://schemas.microsoft.com/office/drawing/2014/main" id="{908FF4DA-EDC3-3F46-DDE7-BE2E691D3B7B}"/>
               </a:ext>
             </a:extLst>
           </p:cNvPr>
@@ -9486,75 +10535,14 @@
         </p:blipFill>
         <p:spPr>
           <a:xfrm>
-            <a:off x="6547022" y="1761362"/>
-            <a:ext cx="4588338" cy="3704718"/>
+            <a:off x="6538917" y="1761362"/>
+            <a:ext cx="4596443" cy="3704717"/>
           </a:xfrm>
           <a:prstGeom prst="rect">
             <a:avLst/>
           </a:prstGeom>
         </p:spPr>
       </p:pic>
-      <p:sp>
-        <p:nvSpPr>
-          <p:cNvPr id="6" name="Textfeld 5">
-            <a:extLst>
-              <a:ext uri="{FF2B5EF4-FFF2-40B4-BE49-F238E27FC236}">
-                <a16:creationId xmlns:a16="http://schemas.microsoft.com/office/drawing/2014/main" id="{F82BA0CB-6FC6-AE48-C63B-A5C2BA6C0ADC}"/>
-              </a:ext>
-            </a:extLst>
-          </p:cNvPr>
-          <p:cNvSpPr txBox="1"/>
-          <p:nvPr/>
-        </p:nvSpPr>
-        <p:spPr>
-          <a:xfrm>
-            <a:off x="10327639" y="1268809"/>
-            <a:ext cx="1524649" cy="246221"/>
-          </a:xfrm>
-          <a:prstGeom prst="rect">
-            <a:avLst/>
-          </a:prstGeom>
-          <a:noFill/>
-        </p:spPr>
-        <p:txBody>
-          <a:bodyPr wrap="square" rtlCol="0">
-            <a:spAutoFit/>
-          </a:bodyPr>
-          <a:lstStyle/>
-          <a:p>
-            <a:r>
-              <a:rPr lang="de-DE" sz="1000" i="1" dirty="0">
-                <a:solidFill>
-                  <a:schemeClr val="tx1">
-                    <a:lumMod val="85000"/>
-                    <a:lumOff val="15000"/>
-                  </a:schemeClr>
-                </a:solidFill>
-              </a:rPr>
-              <a:t>Visualisiert mit </a:t>
-            </a:r>
-            <a:r>
-              <a:rPr lang="de-DE" sz="1000" i="1" dirty="0" err="1">
-                <a:solidFill>
-                  <a:schemeClr val="tx1">
-                    <a:lumMod val="85000"/>
-                    <a:lumOff val="15000"/>
-                  </a:schemeClr>
-                </a:solidFill>
-              </a:rPr>
-              <a:t>Matplotlib</a:t>
-            </a:r>
-            <a:endParaRPr lang="de-DE" sz="1000" i="1" dirty="0">
-              <a:solidFill>
-                <a:schemeClr val="tx1">
-                  <a:lumMod val="85000"/>
-                  <a:lumOff val="15000"/>
-                </a:schemeClr>
-              </a:solidFill>
-            </a:endParaRPr>
-          </a:p>
-        </p:txBody>
-      </p:sp>
     </p:spTree>
     <p:extLst>
       <p:ext uri="{BB962C8B-B14F-4D97-AF65-F5344CB8AC3E}">

</xml_diff>

<commit_message>
Small changes in powerpoint
</commit_message>
<xml_diff>
--- a/Clustering_Scikit_Learn.pptx
+++ b/Clustering_Scikit_Learn.pptx
@@ -292,7 +292,7 @@
           <a:p>
             <a:fld id="{59667570-53A1-459B-AA66-F38DF90E72D9}" type="datetimeFigureOut">
               <a:rPr lang="de-DE" smtClean="0"/>
-              <a:t>26.11.2022</a:t>
+              <a:t>29.11.2022</a:t>
             </a:fld>
             <a:endParaRPr lang="de-DE" dirty="0"/>
           </a:p>
@@ -514,7 +514,7 @@
           <a:p>
             <a:fld id="{59667570-53A1-459B-AA66-F38DF90E72D9}" type="datetimeFigureOut">
               <a:rPr lang="de-DE" smtClean="0"/>
-              <a:t>26.11.2022</a:t>
+              <a:t>29.11.2022</a:t>
             </a:fld>
             <a:endParaRPr lang="de-DE"/>
           </a:p>
@@ -722,7 +722,7 @@
           <a:p>
             <a:fld id="{59667570-53A1-459B-AA66-F38DF90E72D9}" type="datetimeFigureOut">
               <a:rPr lang="de-DE" smtClean="0"/>
-              <a:t>26.11.2022</a:t>
+              <a:t>29.11.2022</a:t>
             </a:fld>
             <a:endParaRPr lang="de-DE"/>
           </a:p>
@@ -920,7 +920,7 @@
           <a:p>
             <a:fld id="{59667570-53A1-459B-AA66-F38DF90E72D9}" type="datetimeFigureOut">
               <a:rPr lang="de-DE" smtClean="0"/>
-              <a:t>26.11.2022</a:t>
+              <a:t>29.11.2022</a:t>
             </a:fld>
             <a:endParaRPr lang="de-DE"/>
           </a:p>
@@ -1219,7 +1219,7 @@
           <a:p>
             <a:fld id="{59667570-53A1-459B-AA66-F38DF90E72D9}" type="datetimeFigureOut">
               <a:rPr lang="de-DE" smtClean="0"/>
-              <a:t>26.11.2022</a:t>
+              <a:t>29.11.2022</a:t>
             </a:fld>
             <a:endParaRPr lang="de-DE" dirty="0"/>
           </a:p>
@@ -1492,7 +1492,7 @@
           <a:p>
             <a:fld id="{59667570-53A1-459B-AA66-F38DF90E72D9}" type="datetimeFigureOut">
               <a:rPr lang="de-DE" smtClean="0"/>
-              <a:t>26.11.2022</a:t>
+              <a:t>29.11.2022</a:t>
             </a:fld>
             <a:endParaRPr lang="de-DE"/>
           </a:p>
@@ -1904,7 +1904,7 @@
           <a:p>
             <a:fld id="{59667570-53A1-459B-AA66-F38DF90E72D9}" type="datetimeFigureOut">
               <a:rPr lang="de-DE" smtClean="0"/>
-              <a:t>26.11.2022</a:t>
+              <a:t>29.11.2022</a:t>
             </a:fld>
             <a:endParaRPr lang="de-DE"/>
           </a:p>
@@ -2045,7 +2045,7 @@
           <a:p>
             <a:fld id="{59667570-53A1-459B-AA66-F38DF90E72D9}" type="datetimeFigureOut">
               <a:rPr lang="de-DE" smtClean="0"/>
-              <a:t>26.11.2022</a:t>
+              <a:t>29.11.2022</a:t>
             </a:fld>
             <a:endParaRPr lang="de-DE"/>
           </a:p>
@@ -2158,7 +2158,7 @@
           <a:p>
             <a:fld id="{59667570-53A1-459B-AA66-F38DF90E72D9}" type="datetimeFigureOut">
               <a:rPr lang="de-DE" smtClean="0"/>
-              <a:t>26.11.2022</a:t>
+              <a:t>29.11.2022</a:t>
             </a:fld>
             <a:endParaRPr lang="de-DE"/>
           </a:p>
@@ -2469,7 +2469,7 @@
           <a:p>
             <a:fld id="{59667570-53A1-459B-AA66-F38DF90E72D9}" type="datetimeFigureOut">
               <a:rPr lang="de-DE" smtClean="0"/>
-              <a:t>26.11.2022</a:t>
+              <a:t>29.11.2022</a:t>
             </a:fld>
             <a:endParaRPr lang="de-DE"/>
           </a:p>
@@ -2757,7 +2757,7 @@
           <a:p>
             <a:fld id="{59667570-53A1-459B-AA66-F38DF90E72D9}" type="datetimeFigureOut">
               <a:rPr lang="de-DE" smtClean="0"/>
-              <a:t>26.11.2022</a:t>
+              <a:t>29.11.2022</a:t>
             </a:fld>
             <a:endParaRPr lang="de-DE"/>
           </a:p>
@@ -7288,7 +7288,7 @@
                   </a:schemeClr>
                 </a:solidFill>
               </a:rPr>
-              <a:t>Original-Datensatz (erste zehn Spalten)</a:t>
+              <a:t>Original-Datensatz (erste zehn Zeilen)</a:t>
             </a:r>
           </a:p>
         </p:txBody>
@@ -7307,8 +7307,8 @@
         </p:nvSpPr>
         <p:spPr>
           <a:xfrm>
-            <a:off x="9107746" y="5593080"/>
-            <a:ext cx="2744542" cy="246221"/>
+            <a:off x="9208450" y="5593080"/>
+            <a:ext cx="2643837" cy="246221"/>
           </a:xfrm>
           <a:prstGeom prst="rect">
             <a:avLst/>
@@ -7330,7 +7330,7 @@
                   </a:schemeClr>
                 </a:solidFill>
               </a:rPr>
-              <a:t>Datensatz nach Aufbereitung (erste zehn Spalten)</a:t>
+              <a:t>Datensatz nach Aufbereitung (erste zehn Zeilen)</a:t>
             </a:r>
           </a:p>
         </p:txBody>
@@ -14627,6 +14627,26 @@
                   </a:schemeClr>
                 </a:solidFill>
               </a:rPr>
+              <a:t>Fazit</a:t>
+            </a:r>
+          </a:p>
+          <a:p>
+            <a:pPr marL="514350" indent="-514350">
+              <a:lnSpc>
+                <a:spcPct val="150000"/>
+              </a:lnSpc>
+              <a:buFont typeface="+mj-lt"/>
+              <a:buAutoNum type="arabicPeriod"/>
+            </a:pPr>
+            <a:r>
+              <a:rPr lang="de-DE" sz="1800" dirty="0">
+                <a:solidFill>
+                  <a:schemeClr val="tx1">
+                    <a:lumMod val="85000"/>
+                    <a:lumOff val="15000"/>
+                  </a:schemeClr>
+                </a:solidFill>
+              </a:rPr>
               <a:t>Kritische Reflexion </a:t>
             </a:r>
             <a:r>
@@ -14658,17 +14678,14 @@
               <a:buFont typeface="+mj-lt"/>
               <a:buAutoNum type="arabicPeriod"/>
             </a:pPr>
-            <a:r>
-              <a:rPr lang="de-DE" sz="1800" dirty="0">
-                <a:solidFill>
-                  <a:schemeClr val="tx1">
-                    <a:lumMod val="85000"/>
-                    <a:lumOff val="15000"/>
-                  </a:schemeClr>
-                </a:solidFill>
-              </a:rPr>
-              <a:t>Fazit</a:t>
-            </a:r>
+            <a:endParaRPr lang="de-DE" sz="1800" dirty="0">
+              <a:solidFill>
+                <a:schemeClr val="tx1">
+                  <a:lumMod val="85000"/>
+                  <a:lumOff val="15000"/>
+                </a:schemeClr>
+              </a:solidFill>
+            </a:endParaRPr>
           </a:p>
         </p:txBody>
       </p:sp>

</xml_diff>